<commit_message>
Update sponsor slides #64
</commit_message>
<xml_diff>
--- a/sponsor_loop.pptx
+++ b/sponsor_loop.pptx
@@ -216,7 +216,7 @@
           <a:p>
             <a:fld id="{26E10EF1-F557-9D42-8470-2B3785BDEEB4}" type="datetimeFigureOut">
               <a:rPr lang="en-US" smtClean="0"/>
-              <a:t>6/8/15</a:t>
+              <a:t>6/10/15</a:t>
             </a:fld>
             <a:endParaRPr lang="en-US"/>
           </a:p>
@@ -381,7 +381,7 @@
           <a:p>
             <a:fld id="{D5D9DE3C-3904-FC48-ACCA-1FAF6D8E369F}" type="datetimeFigureOut">
               <a:rPr lang="en-US" smtClean="0"/>
-              <a:t>6/8/15</a:t>
+              <a:t>6/10/15</a:t>
             </a:fld>
             <a:endParaRPr lang="en-US"/>
           </a:p>
@@ -6595,17 +6595,27 @@
           </a:p>
         </p:txBody>
       </p:sp>
+      <p:sp>
+        <p:nvSpPr>
+          <p:cNvPr id="4" name="Picture Placeholder 3"/>
+          <p:cNvSpPr>
+            <a:spLocks noGrp="1"/>
+          </p:cNvSpPr>
+          <p:nvPr>
+            <p:ph type="pic" sz="quarter" idx="14"/>
+          </p:nvPr>
+        </p:nvSpPr>
+        <p:spPr/>
+      </p:sp>
       <p:pic>
         <p:nvPicPr>
-          <p:cNvPr id="5" name="Picture 2"/>
+          <p:cNvPr id="6" name="Picture Placeholder 5" descr="logo_by_luminal-01 (1).jpg"/>
           <p:cNvPicPr>
-            <a:picLocks noGrp="1" noChangeAspect="1" noChangeArrowheads="1"/>
+            <a:picLocks noChangeAspect="1"/>
           </p:cNvPicPr>
-          <p:nvPr>
-            <p:ph type="pic" sz="quarter" idx="14"/>
-          </p:nvPr>
+          <p:nvPr/>
         </p:nvPicPr>
-        <p:blipFill>
+        <p:blipFill rotWithShape="1">
           <a:blip r:embed="rId2">
             <a:extLst>
               <a:ext uri="{28A0092B-C50C-407E-A947-70E740481C1C}">
@@ -6613,48 +6623,17 @@
               </a:ext>
             </a:extLst>
           </a:blip>
-          <a:srcRect t="-21608" b="-21608"/>
-          <a:stretch>
-            <a:fillRect/>
-          </a:stretch>
+          <a:srcRect t="8320" b="22928"/>
+          <a:stretch/>
         </p:blipFill>
-        <p:spPr bwMode="auto">
+        <p:spPr>
+          <a:xfrm>
+            <a:off x="457200" y="1168400"/>
+            <a:ext cx="8229600" cy="2786196"/>
+          </a:xfrm>
           <a:prstGeom prst="rect">
             <a:avLst/>
           </a:prstGeom>
-          <a:noFill/>
-          <a:ln>
-            <a:noFill/>
-          </a:ln>
-          <a:effectLst/>
-          <a:extLst>
-            <a:ext uri="{909E8E84-426E-40dd-AFC4-6F175D3DCCD1}">
-              <a14:hiddenFill xmlns:a14="http://schemas.microsoft.com/office/drawing/2010/main">
-                <a:solidFill>
-                  <a:schemeClr val="accent1"/>
-                </a:solidFill>
-              </a14:hiddenFill>
-            </a:ext>
-            <a:ext uri="{91240B29-F687-4f45-9708-019B960494DF}">
-              <a14:hiddenLine xmlns:a14="http://schemas.microsoft.com/office/drawing/2010/main" w="9525">
-                <a:solidFill>
-                  <a:schemeClr val="tx1"/>
-                </a:solidFill>
-                <a:miter lim="800000"/>
-                <a:headEnd/>
-                <a:tailEnd/>
-              </a14:hiddenLine>
-            </a:ext>
-            <a:ext uri="{AF507438-7753-43e0-B8FC-AC1667EBCBE1}">
-              <a14:hiddenEffects xmlns:a14="http://schemas.microsoft.com/office/drawing/2010/main">
-                <a:effectLst>
-                  <a:outerShdw dist="35921" dir="2700000" algn="ctr" rotWithShape="0">
-                    <a:schemeClr val="bg2"/>
-                  </a:outerShdw>
-                </a:effectLst>
-              </a14:hiddenEffects>
-            </a:ext>
-          </a:extLst>
         </p:spPr>
       </p:pic>
     </p:spTree>

</xml_diff>